<commit_message>
HW2 - Final Challenge - Tuesday night submit
</commit_message>
<xml_diff>
--- a/Working/HW2_Working/Box Model Hand-Built MODFlow- Noonan and Hull.pptx
+++ b/Working/HW2_Working/Box Model Hand-Built MODFlow- Noonan and Hull.pptx
@@ -146,8 +146,9 @@
 <file path=ppt/revisionInfo.xml><?xml version="1.0" encoding="utf-8"?>
 <p1510:revInfo xmlns:a="http://schemas.openxmlformats.org/drawingml/2006/main" xmlns:r="http://schemas.openxmlformats.org/officeDocument/2006/relationships" xmlns:p1510="http://schemas.microsoft.com/office/powerpoint/2015/10/main">
   <p1510:revLst>
-    <p1510:client id="{001C6D4C-82A5-4F92-BC2D-10513144624D}" v="2327" dt="2021-01-26T03:05:19.821"/>
+    <p1510:client id="{001C6D4C-82A5-4F92-BC2D-10513144624D}" v="2341" dt="2021-01-26T20:47:42.850"/>
     <p1510:client id="{8997B270-1EF4-BF71-3FD7-2B3B89A2ADA8}" v="4906" vWet="4907" dt="2021-01-26T00:52:55.959"/>
+    <p1510:client id="{A3154B18-AF3A-0564-DAB2-B0395AED6F58}" v="201" dt="2021-01-26T20:46:56.316"/>
   </p1510:revLst>
 </p1510:revInfo>
 </file>
@@ -1108,7 +1109,7 @@
   <pc:docChgLst>
     <pc:chgData name="Noonan, Gillian E - (genoonan)" userId="e2e1e41b-4939-4e27-8e97-16e839cdb40d" providerId="ADAL" clId="{001C6D4C-82A5-4F92-BC2D-10513144624D}"/>
     <pc:docChg chg="undo redo custSel addSld delSld modSld sldOrd">
-      <pc:chgData name="Noonan, Gillian E - (genoonan)" userId="e2e1e41b-4939-4e27-8e97-16e839cdb40d" providerId="ADAL" clId="{001C6D4C-82A5-4F92-BC2D-10513144624D}" dt="2021-01-26T03:16:02.948" v="3244" actId="1076"/>
+      <pc:chgData name="Noonan, Gillian E - (genoonan)" userId="e2e1e41b-4939-4e27-8e97-16e839cdb40d" providerId="ADAL" clId="{001C6D4C-82A5-4F92-BC2D-10513144624D}" dt="2021-01-26T20:47:42.850" v="3277" actId="1076"/>
       <pc:docMkLst>
         <pc:docMk/>
       </pc:docMkLst>
@@ -1340,7 +1341,7 @@
         </pc:picChg>
       </pc:sldChg>
       <pc:sldChg chg="addSp modSp mod">
-        <pc:chgData name="Noonan, Gillian E - (genoonan)" userId="e2e1e41b-4939-4e27-8e97-16e839cdb40d" providerId="ADAL" clId="{001C6D4C-82A5-4F92-BC2D-10513144624D}" dt="2021-01-26T03:07:35.476" v="2981" actId="20577"/>
+        <pc:chgData name="Noonan, Gillian E - (genoonan)" userId="e2e1e41b-4939-4e27-8e97-16e839cdb40d" providerId="ADAL" clId="{001C6D4C-82A5-4F92-BC2D-10513144624D}" dt="2021-01-26T03:26:33.805" v="3263" actId="20577"/>
         <pc:sldMkLst>
           <pc:docMk/>
           <pc:sldMk cId="3194975526" sldId="272"/>
@@ -1354,7 +1355,7 @@
           </ac:spMkLst>
         </pc:spChg>
         <pc:spChg chg="mod">
-          <ac:chgData name="Noonan, Gillian E - (genoonan)" userId="e2e1e41b-4939-4e27-8e97-16e839cdb40d" providerId="ADAL" clId="{001C6D4C-82A5-4F92-BC2D-10513144624D}" dt="2021-01-26T00:18:23.442" v="1547" actId="6549"/>
+          <ac:chgData name="Noonan, Gillian E - (genoonan)" userId="e2e1e41b-4939-4e27-8e97-16e839cdb40d" providerId="ADAL" clId="{001C6D4C-82A5-4F92-BC2D-10513144624D}" dt="2021-01-26T03:26:33.805" v="3263" actId="20577"/>
           <ac:spMkLst>
             <pc:docMk/>
             <pc:sldMk cId="3194975526" sldId="272"/>
@@ -2109,7 +2110,7 @@
         </pc:sldMkLst>
       </pc:sldChg>
       <pc:sldChg chg="addSp delSp modSp add mod modAnim modNotesTx">
-        <pc:chgData name="Noonan, Gillian E - (genoonan)" userId="e2e1e41b-4939-4e27-8e97-16e839cdb40d" providerId="ADAL" clId="{001C6D4C-82A5-4F92-BC2D-10513144624D}" dt="2021-01-26T03:02:21.886" v="2831" actId="1076"/>
+        <pc:chgData name="Noonan, Gillian E - (genoonan)" userId="e2e1e41b-4939-4e27-8e97-16e839cdb40d" providerId="ADAL" clId="{001C6D4C-82A5-4F92-BC2D-10513144624D}" dt="2021-01-26T20:47:21.078" v="3272" actId="1076"/>
         <pc:sldMkLst>
           <pc:docMk/>
           <pc:sldMk cId="1316662711" sldId="280"/>
@@ -2122,6 +2123,14 @@
             <ac:spMk id="2" creationId="{39ABA70D-B615-4025-8C35-5C912E7F0778}"/>
           </ac:spMkLst>
         </pc:spChg>
+        <pc:spChg chg="mod">
+          <ac:chgData name="Noonan, Gillian E - (genoonan)" userId="e2e1e41b-4939-4e27-8e97-16e839cdb40d" providerId="ADAL" clId="{001C6D4C-82A5-4F92-BC2D-10513144624D}" dt="2021-01-26T20:44:49.761" v="3267" actId="20577"/>
+          <ac:spMkLst>
+            <pc:docMk/>
+            <pc:sldMk cId="1316662711" sldId="280"/>
+            <ac:spMk id="3" creationId="{CB478A3A-D252-4F90-9F16-48011906BC8D}"/>
+          </ac:spMkLst>
+        </pc:spChg>
         <pc:spChg chg="del">
           <ac:chgData name="Noonan, Gillian E - (genoonan)" userId="e2e1e41b-4939-4e27-8e97-16e839cdb40d" providerId="ADAL" clId="{001C6D4C-82A5-4F92-BC2D-10513144624D}" dt="2021-01-26T02:46:41.554" v="2364" actId="478"/>
           <ac:spMkLst>
@@ -2211,7 +2220,7 @@
           </ac:spMkLst>
         </pc:spChg>
         <pc:spChg chg="mod">
-          <ac:chgData name="Noonan, Gillian E - (genoonan)" userId="e2e1e41b-4939-4e27-8e97-16e839cdb40d" providerId="ADAL" clId="{001C6D4C-82A5-4F92-BC2D-10513144624D}" dt="2021-01-26T00:59:43.253" v="1667" actId="1036"/>
+          <ac:chgData name="Noonan, Gillian E - (genoonan)" userId="e2e1e41b-4939-4e27-8e97-16e839cdb40d" providerId="ADAL" clId="{001C6D4C-82A5-4F92-BC2D-10513144624D}" dt="2021-01-26T20:47:14.712" v="3271" actId="6549"/>
           <ac:spMkLst>
             <pc:docMk/>
             <pc:sldMk cId="1316662711" sldId="280"/>
@@ -2339,7 +2348,7 @@
           </ac:grpSpMkLst>
         </pc:grpChg>
         <pc:grpChg chg="add mod">
-          <ac:chgData name="Noonan, Gillian E - (genoonan)" userId="e2e1e41b-4939-4e27-8e97-16e839cdb40d" providerId="ADAL" clId="{001C6D4C-82A5-4F92-BC2D-10513144624D}" dt="2021-01-26T01:47:09.054" v="2156" actId="164"/>
+          <ac:chgData name="Noonan, Gillian E - (genoonan)" userId="e2e1e41b-4939-4e27-8e97-16e839cdb40d" providerId="ADAL" clId="{001C6D4C-82A5-4F92-BC2D-10513144624D}" dt="2021-01-26T20:47:21.078" v="3272" actId="1076"/>
           <ac:grpSpMkLst>
             <pc:docMk/>
             <pc:sldMk cId="1316662711" sldId="280"/>
@@ -2412,7 +2421,7 @@
         </pc:cxnChg>
       </pc:sldChg>
       <pc:sldChg chg="addSp delSp modSp add mod modAnim modNotesTx">
-        <pc:chgData name="Noonan, Gillian E - (genoonan)" userId="e2e1e41b-4939-4e27-8e97-16e839cdb40d" providerId="ADAL" clId="{001C6D4C-82A5-4F92-BC2D-10513144624D}" dt="2021-01-26T03:03:56.757" v="2839"/>
+        <pc:chgData name="Noonan, Gillian E - (genoonan)" userId="e2e1e41b-4939-4e27-8e97-16e839cdb40d" providerId="ADAL" clId="{001C6D4C-82A5-4F92-BC2D-10513144624D}" dt="2021-01-26T20:47:42.850" v="3277" actId="1076"/>
         <pc:sldMkLst>
           <pc:docMk/>
           <pc:sldMk cId="3165532438" sldId="281"/>
@@ -2426,7 +2435,7 @@
           </ac:spMkLst>
         </pc:spChg>
         <pc:spChg chg="mod">
-          <ac:chgData name="Noonan, Gillian E - (genoonan)" userId="e2e1e41b-4939-4e27-8e97-16e839cdb40d" providerId="ADAL" clId="{001C6D4C-82A5-4F92-BC2D-10513144624D}" dt="2021-01-26T03:00:34.364" v="2725" actId="1076"/>
+          <ac:chgData name="Noonan, Gillian E - (genoonan)" userId="e2e1e41b-4939-4e27-8e97-16e839cdb40d" providerId="ADAL" clId="{001C6D4C-82A5-4F92-BC2D-10513144624D}" dt="2021-01-26T20:47:35.745" v="3275" actId="6549"/>
           <ac:spMkLst>
             <pc:docMk/>
             <pc:sldMk cId="3165532438" sldId="281"/>
@@ -2466,7 +2475,7 @@
           </ac:spMkLst>
         </pc:spChg>
         <pc:spChg chg="mod">
-          <ac:chgData name="Noonan, Gillian E - (genoonan)" userId="e2e1e41b-4939-4e27-8e97-16e839cdb40d" providerId="ADAL" clId="{001C6D4C-82A5-4F92-BC2D-10513144624D}" dt="2021-01-26T03:00:48.949" v="2820" actId="1038"/>
+          <ac:chgData name="Noonan, Gillian E - (genoonan)" userId="e2e1e41b-4939-4e27-8e97-16e839cdb40d" providerId="ADAL" clId="{001C6D4C-82A5-4F92-BC2D-10513144624D}" dt="2021-01-26T20:47:33.806" v="3274" actId="6549"/>
           <ac:spMkLst>
             <pc:docMk/>
             <pc:sldMk cId="3165532438" sldId="281"/>
@@ -2538,7 +2547,7 @@
           </ac:grpSpMkLst>
         </pc:grpChg>
         <pc:picChg chg="add mod ord modCrop">
-          <ac:chgData name="Noonan, Gillian E - (genoonan)" userId="e2e1e41b-4939-4e27-8e97-16e839cdb40d" providerId="ADAL" clId="{001C6D4C-82A5-4F92-BC2D-10513144624D}" dt="2021-01-26T03:03:40.961" v="2838" actId="170"/>
+          <ac:chgData name="Noonan, Gillian E - (genoonan)" userId="e2e1e41b-4939-4e27-8e97-16e839cdb40d" providerId="ADAL" clId="{001C6D4C-82A5-4F92-BC2D-10513144624D}" dt="2021-01-26T20:47:42.850" v="3277" actId="1076"/>
           <ac:picMkLst>
             <pc:docMk/>
             <pc:sldMk cId="3165532438" sldId="281"/>
@@ -2902,6 +2911,137 @@
             <ac:spMk id="27" creationId="{881C9C00-FEA7-4056-8E5A-204E1BB08BC7}"/>
           </ac:spMkLst>
         </pc:spChg>
+      </pc:sldChg>
+    </pc:docChg>
+  </pc:docChgLst>
+  <pc:docChgLst>
+    <pc:chgData name="Hull, Robert Bruce - (roberthull)" userId="S::roberthull@email.arizona.edu::a57ba644-6c49-4726-8348-051b7a012ed7" providerId="AD" clId="Web-{A3154B18-AF3A-0564-DAB2-B0395AED6F58}"/>
+    <pc:docChg chg="modSld">
+      <pc:chgData name="Hull, Robert Bruce - (roberthull)" userId="S::roberthull@email.arizona.edu::a57ba644-6c49-4726-8348-051b7a012ed7" providerId="AD" clId="Web-{A3154B18-AF3A-0564-DAB2-B0395AED6F58}" dt="2021-01-26T20:46:56.316" v="114" actId="1076"/>
+      <pc:docMkLst>
+        <pc:docMk/>
+      </pc:docMkLst>
+      <pc:sldChg chg="modSp">
+        <pc:chgData name="Hull, Robert Bruce - (roberthull)" userId="S::roberthull@email.arizona.edu::a57ba644-6c49-4726-8348-051b7a012ed7" providerId="AD" clId="Web-{A3154B18-AF3A-0564-DAB2-B0395AED6F58}" dt="2021-01-26T19:55:57.502" v="56" actId="20577"/>
+        <pc:sldMkLst>
+          <pc:docMk/>
+          <pc:sldMk cId="3194975526" sldId="272"/>
+        </pc:sldMkLst>
+        <pc:spChg chg="mod">
+          <ac:chgData name="Hull, Robert Bruce - (roberthull)" userId="S::roberthull@email.arizona.edu::a57ba644-6c49-4726-8348-051b7a012ed7" providerId="AD" clId="Web-{A3154B18-AF3A-0564-DAB2-B0395AED6F58}" dt="2021-01-26T19:55:57.502" v="56" actId="20577"/>
+          <ac:spMkLst>
+            <pc:docMk/>
+            <pc:sldMk cId="3194975526" sldId="272"/>
+            <ac:spMk id="3" creationId="{20AFD1AF-E0A9-472B-B233-EA1322127850}"/>
+          </ac:spMkLst>
+        </pc:spChg>
+      </pc:sldChg>
+      <pc:sldChg chg="modSp addAnim delAnim">
+        <pc:chgData name="Hull, Robert Bruce - (roberthull)" userId="S::roberthull@email.arizona.edu::a57ba644-6c49-4726-8348-051b7a012ed7" providerId="AD" clId="Web-{A3154B18-AF3A-0564-DAB2-B0395AED6F58}" dt="2021-01-26T20:46:56.316" v="114" actId="1076"/>
+        <pc:sldMkLst>
+          <pc:docMk/>
+          <pc:sldMk cId="583899372" sldId="273"/>
+        </pc:sldMkLst>
+        <pc:spChg chg="mod">
+          <ac:chgData name="Hull, Robert Bruce - (roberthull)" userId="S::roberthull@email.arizona.edu::a57ba644-6c49-4726-8348-051b7a012ed7" providerId="AD" clId="Web-{A3154B18-AF3A-0564-DAB2-B0395AED6F58}" dt="2021-01-26T20:46:04.095" v="106" actId="1076"/>
+          <ac:spMkLst>
+            <pc:docMk/>
+            <pc:sldMk cId="583899372" sldId="273"/>
+            <ac:spMk id="3" creationId="{CB478A3A-D252-4F90-9F16-48011906BC8D}"/>
+          </ac:spMkLst>
+        </pc:spChg>
+        <pc:spChg chg="mod">
+          <ac:chgData name="Hull, Robert Bruce - (roberthull)" userId="S::roberthull@email.arizona.edu::a57ba644-6c49-4726-8348-051b7a012ed7" providerId="AD" clId="Web-{A3154B18-AF3A-0564-DAB2-B0395AED6F58}" dt="2021-01-26T20:46:46.847" v="113" actId="20577"/>
+          <ac:spMkLst>
+            <pc:docMk/>
+            <pc:sldMk cId="583899372" sldId="273"/>
+            <ac:spMk id="7" creationId="{205FF22A-261D-4EC4-A51B-F35D8860243A}"/>
+          </ac:spMkLst>
+        </pc:spChg>
+        <pc:spChg chg="mod">
+          <ac:chgData name="Hull, Robert Bruce - (roberthull)" userId="S::roberthull@email.arizona.edu::a57ba644-6c49-4726-8348-051b7a012ed7" providerId="AD" clId="Web-{A3154B18-AF3A-0564-DAB2-B0395AED6F58}" dt="2021-01-26T20:46:11.407" v="108" actId="20577"/>
+          <ac:spMkLst>
+            <pc:docMk/>
+            <pc:sldMk cId="583899372" sldId="273"/>
+            <ac:spMk id="28" creationId="{E32909EB-00CD-4C1E-8FEB-1046F0E28944}"/>
+          </ac:spMkLst>
+        </pc:spChg>
+        <pc:grpChg chg="mod">
+          <ac:chgData name="Hull, Robert Bruce - (roberthull)" userId="S::roberthull@email.arizona.edu::a57ba644-6c49-4726-8348-051b7a012ed7" providerId="AD" clId="Web-{A3154B18-AF3A-0564-DAB2-B0395AED6F58}" dt="2021-01-26T20:46:56.316" v="114" actId="1076"/>
+          <ac:grpSpMkLst>
+            <pc:docMk/>
+            <pc:sldMk cId="583899372" sldId="273"/>
+            <ac:grpSpMk id="13" creationId="{D6C8E9D1-6721-46CC-AD81-C249A7AB6402}"/>
+          </ac:grpSpMkLst>
+        </pc:grpChg>
+      </pc:sldChg>
+      <pc:sldChg chg="modSp">
+        <pc:chgData name="Hull, Robert Bruce - (roberthull)" userId="S::roberthull@email.arizona.edu::a57ba644-6c49-4726-8348-051b7a012ed7" providerId="AD" clId="Web-{A3154B18-AF3A-0564-DAB2-B0395AED6F58}" dt="2021-01-26T19:48:56.996" v="9" actId="1076"/>
+        <pc:sldMkLst>
+          <pc:docMk/>
+          <pc:sldMk cId="157949535" sldId="274"/>
+        </pc:sldMkLst>
+        <pc:picChg chg="mod">
+          <ac:chgData name="Hull, Robert Bruce - (roberthull)" userId="S::roberthull@email.arizona.edu::a57ba644-6c49-4726-8348-051b7a012ed7" providerId="AD" clId="Web-{A3154B18-AF3A-0564-DAB2-B0395AED6F58}" dt="2021-01-26T19:48:55.590" v="8" actId="1076"/>
+          <ac:picMkLst>
+            <pc:docMk/>
+            <pc:sldMk cId="157949535" sldId="274"/>
+            <ac:picMk id="19" creationId="{2B0494F7-D2AE-40CE-8503-2493A410A4C8}"/>
+          </ac:picMkLst>
+        </pc:picChg>
+        <pc:picChg chg="mod">
+          <ac:chgData name="Hull, Robert Bruce - (roberthull)" userId="S::roberthull@email.arizona.edu::a57ba644-6c49-4726-8348-051b7a012ed7" providerId="AD" clId="Web-{A3154B18-AF3A-0564-DAB2-B0395AED6F58}" dt="2021-01-26T19:48:56.996" v="9" actId="1076"/>
+          <ac:picMkLst>
+            <pc:docMk/>
+            <pc:sldMk cId="157949535" sldId="274"/>
+            <ac:picMk id="20" creationId="{DFB539B7-95A6-453A-B1AF-8353F3A41487}"/>
+          </ac:picMkLst>
+        </pc:picChg>
+      </pc:sldChg>
+      <pc:sldChg chg="modSp">
+        <pc:chgData name="Hull, Robert Bruce - (roberthull)" userId="S::roberthull@email.arizona.edu::a57ba644-6c49-4726-8348-051b7a012ed7" providerId="AD" clId="Web-{A3154B18-AF3A-0564-DAB2-B0395AED6F58}" dt="2021-01-26T20:33:10.180" v="97" actId="1076"/>
+        <pc:sldMkLst>
+          <pc:docMk/>
+          <pc:sldMk cId="194318421" sldId="277"/>
+        </pc:sldMkLst>
+        <pc:grpChg chg="mod">
+          <ac:chgData name="Hull, Robert Bruce - (roberthull)" userId="S::roberthull@email.arizona.edu::a57ba644-6c49-4726-8348-051b7a012ed7" providerId="AD" clId="Web-{A3154B18-AF3A-0564-DAB2-B0395AED6F58}" dt="2021-01-26T20:33:10.180" v="97" actId="1076"/>
+          <ac:grpSpMkLst>
+            <pc:docMk/>
+            <pc:sldMk cId="194318421" sldId="277"/>
+            <ac:grpSpMk id="10" creationId="{DE8AB026-11DD-4488-937A-9A6D3AE26EE3}"/>
+          </ac:grpSpMkLst>
+        </pc:grpChg>
+      </pc:sldChg>
+      <pc:sldChg chg="modSp">
+        <pc:chgData name="Hull, Robert Bruce - (roberthull)" userId="S::roberthull@email.arizona.edu::a57ba644-6c49-4726-8348-051b7a012ed7" providerId="AD" clId="Web-{A3154B18-AF3A-0564-DAB2-B0395AED6F58}" dt="2021-01-26T20:29:19.168" v="95" actId="20577"/>
+        <pc:sldMkLst>
+          <pc:docMk/>
+          <pc:sldMk cId="236273417" sldId="278"/>
+        </pc:sldMkLst>
+        <pc:spChg chg="mod">
+          <ac:chgData name="Hull, Robert Bruce - (roberthull)" userId="S::roberthull@email.arizona.edu::a57ba644-6c49-4726-8348-051b7a012ed7" providerId="AD" clId="Web-{A3154B18-AF3A-0564-DAB2-B0395AED6F58}" dt="2021-01-26T20:29:19.168" v="95" actId="20577"/>
+          <ac:spMkLst>
+            <pc:docMk/>
+            <pc:sldMk cId="236273417" sldId="278"/>
+            <ac:spMk id="3" creationId="{4F01B5F7-C757-4744-B621-94ECCBDE3C00}"/>
+          </ac:spMkLst>
+        </pc:spChg>
+      </pc:sldChg>
+      <pc:sldChg chg="modSp">
+        <pc:chgData name="Hull, Robert Bruce - (roberthull)" userId="S::roberthull@email.arizona.edu::a57ba644-6c49-4726-8348-051b7a012ed7" providerId="AD" clId="Web-{A3154B18-AF3A-0564-DAB2-B0395AED6F58}" dt="2021-01-26T20:07:18.866" v="60" actId="1076"/>
+        <pc:sldMkLst>
+          <pc:docMk/>
+          <pc:sldMk cId="2506539876" sldId="284"/>
+        </pc:sldMkLst>
+        <pc:picChg chg="mod">
+          <ac:chgData name="Hull, Robert Bruce - (roberthull)" userId="S::roberthull@email.arizona.edu::a57ba644-6c49-4726-8348-051b7a012ed7" providerId="AD" clId="Web-{A3154B18-AF3A-0564-DAB2-B0395AED6F58}" dt="2021-01-26T20:07:18.866" v="60" actId="1076"/>
+          <ac:picMkLst>
+            <pc:docMk/>
+            <pc:sldMk cId="2506539876" sldId="284"/>
+            <ac:picMk id="4" creationId="{CB5BE335-8334-4037-87DE-9906DFB421F4}"/>
+          </ac:picMkLst>
+        </pc:picChg>
       </pc:sldChg>
     </pc:docChg>
   </pc:docChgLst>
@@ -2990,7 +3130,7 @@
           <a:p>
             <a:fld id="{154EE5AB-65A1-4204-A54E-0147DDFB28B8}" type="datetimeFigureOut">
               <a:rPr lang="en-US"/>
-              <a:t>1/25/2021</a:t>
+              <a:t>1/26/2021</a:t>
             </a:fld>
             <a:endParaRPr lang="en-US"/>
           </a:p>
@@ -3390,7 +3530,7 @@
           <a:bodyPr/>
           <a:lstStyle/>
           <a:p>
-            <a:endParaRPr lang="en-US" dirty="0">
+            <a:endParaRPr lang="en-US">
               <a:cs typeface="Calibri"/>
             </a:endParaRPr>
           </a:p>
@@ -3476,7 +3616,7 @@
           <a:bodyPr/>
           <a:lstStyle/>
           <a:p>
-            <a:endParaRPr lang="en-US" dirty="0">
+            <a:endParaRPr lang="en-US">
               <a:cs typeface="Calibri"/>
             </a:endParaRPr>
           </a:p>
@@ -3562,7 +3702,7 @@
           <a:bodyPr/>
           <a:lstStyle/>
           <a:p>
-            <a:endParaRPr lang="en-US" dirty="0">
+            <a:endParaRPr lang="en-US">
               <a:cs typeface="Calibri"/>
             </a:endParaRPr>
           </a:p>
@@ -3834,7 +3974,7 @@
           <a:bodyPr/>
           <a:lstStyle/>
           <a:p>
-            <a:endParaRPr lang="en-US" dirty="0">
+            <a:endParaRPr lang="en-US">
               <a:cs typeface="Calibri"/>
             </a:endParaRPr>
           </a:p>
@@ -4211,7 +4351,7 @@
           <a:p>
             <a:fld id="{7D73451E-3555-4E54-A796-44CD2CEB71E5}" type="datetimeFigureOut">
               <a:rPr lang="en-US" smtClean="0"/>
-              <a:t>1/25/2021</a:t>
+              <a:t>1/26/2021</a:t>
             </a:fld>
             <a:endParaRPr lang="en-US"/>
           </a:p>
@@ -4409,7 +4549,7 @@
           <a:p>
             <a:fld id="{7D73451E-3555-4E54-A796-44CD2CEB71E5}" type="datetimeFigureOut">
               <a:rPr lang="en-US" smtClean="0"/>
-              <a:t>1/25/2021</a:t>
+              <a:t>1/26/2021</a:t>
             </a:fld>
             <a:endParaRPr lang="en-US"/>
           </a:p>
@@ -4617,7 +4757,7 @@
           <a:p>
             <a:fld id="{7D73451E-3555-4E54-A796-44CD2CEB71E5}" type="datetimeFigureOut">
               <a:rPr lang="en-US" smtClean="0"/>
-              <a:t>1/25/2021</a:t>
+              <a:t>1/26/2021</a:t>
             </a:fld>
             <a:endParaRPr lang="en-US"/>
           </a:p>
@@ -4815,7 +4955,7 @@
           <a:p>
             <a:fld id="{7D73451E-3555-4E54-A796-44CD2CEB71E5}" type="datetimeFigureOut">
               <a:rPr lang="en-US" smtClean="0"/>
-              <a:t>1/25/2021</a:t>
+              <a:t>1/26/2021</a:t>
             </a:fld>
             <a:endParaRPr lang="en-US"/>
           </a:p>
@@ -5090,7 +5230,7 @@
           <a:p>
             <a:fld id="{7D73451E-3555-4E54-A796-44CD2CEB71E5}" type="datetimeFigureOut">
               <a:rPr lang="en-US" smtClean="0"/>
-              <a:t>1/25/2021</a:t>
+              <a:t>1/26/2021</a:t>
             </a:fld>
             <a:endParaRPr lang="en-US"/>
           </a:p>
@@ -5355,7 +5495,7 @@
           <a:p>
             <a:fld id="{7D73451E-3555-4E54-A796-44CD2CEB71E5}" type="datetimeFigureOut">
               <a:rPr lang="en-US" smtClean="0"/>
-              <a:t>1/25/2021</a:t>
+              <a:t>1/26/2021</a:t>
             </a:fld>
             <a:endParaRPr lang="en-US"/>
           </a:p>
@@ -5767,7 +5907,7 @@
           <a:p>
             <a:fld id="{7D73451E-3555-4E54-A796-44CD2CEB71E5}" type="datetimeFigureOut">
               <a:rPr lang="en-US" smtClean="0"/>
-              <a:t>1/25/2021</a:t>
+              <a:t>1/26/2021</a:t>
             </a:fld>
             <a:endParaRPr lang="en-US"/>
           </a:p>
@@ -5908,7 +6048,7 @@
           <a:p>
             <a:fld id="{7D73451E-3555-4E54-A796-44CD2CEB71E5}" type="datetimeFigureOut">
               <a:rPr lang="en-US" smtClean="0"/>
-              <a:t>1/25/2021</a:t>
+              <a:t>1/26/2021</a:t>
             </a:fld>
             <a:endParaRPr lang="en-US"/>
           </a:p>
@@ -6021,7 +6161,7 @@
           <a:p>
             <a:fld id="{7D73451E-3555-4E54-A796-44CD2CEB71E5}" type="datetimeFigureOut">
               <a:rPr lang="en-US" smtClean="0"/>
-              <a:t>1/25/2021</a:t>
+              <a:t>1/26/2021</a:t>
             </a:fld>
             <a:endParaRPr lang="en-US"/>
           </a:p>
@@ -6332,7 +6472,7 @@
           <a:p>
             <a:fld id="{7D73451E-3555-4E54-A796-44CD2CEB71E5}" type="datetimeFigureOut">
               <a:rPr lang="en-US" smtClean="0"/>
-              <a:t>1/25/2021</a:t>
+              <a:t>1/26/2021</a:t>
             </a:fld>
             <a:endParaRPr lang="en-US"/>
           </a:p>
@@ -6620,7 +6760,7 @@
           <a:p>
             <a:fld id="{7D73451E-3555-4E54-A796-44CD2CEB71E5}" type="datetimeFigureOut">
               <a:rPr lang="en-US" smtClean="0"/>
-              <a:t>1/25/2021</a:t>
+              <a:t>1/26/2021</a:t>
             </a:fld>
             <a:endParaRPr lang="en-US"/>
           </a:p>
@@ -6861,7 +7001,7 @@
           <a:p>
             <a:fld id="{7D73451E-3555-4E54-A796-44CD2CEB71E5}" type="datetimeFigureOut">
               <a:rPr lang="en-US" smtClean="0"/>
-              <a:t>1/25/2021</a:t>
+              <a:t>1/26/2021</a:t>
             </a:fld>
             <a:endParaRPr lang="en-US"/>
           </a:p>
@@ -7302,7 +7442,7 @@
           <a:lstStyle/>
           <a:p>
             <a:r>
-              <a:rPr lang="en-US" b="1" dirty="0">
+              <a:rPr lang="en-US" b="1">
                 <a:solidFill>
                   <a:srgbClr val="C00000"/>
                 </a:solidFill>
@@ -7311,17 +7451,17 @@
               <a:t>Assignment 2:</a:t>
             </a:r>
             <a:br>
-              <a:rPr lang="en-US" dirty="0">
+              <a:rPr lang="en-US">
                 <a:cs typeface="Calibri Light"/>
               </a:rPr>
             </a:br>
             <a:r>
-              <a:rPr lang="en-US" dirty="0">
+              <a:rPr lang="en-US">
                 <a:cs typeface="Calibri Light"/>
               </a:rPr>
               <a:t>The Struggle of the Hand Built MODFLOW Box Model</a:t>
             </a:r>
-            <a:endParaRPr lang="en-US" dirty="0"/>
+            <a:endParaRPr lang="en-US"/>
           </a:p>
         </p:txBody>
       </p:sp>
@@ -7352,7 +7492,7 @@
           <a:lstStyle/>
           <a:p>
             <a:r>
-              <a:rPr lang="en-US" dirty="0">
+              <a:rPr lang="en-US">
                 <a:solidFill>
                   <a:schemeClr val="accent1"/>
                 </a:solidFill>
@@ -7362,7 +7502,7 @@
           </a:p>
           <a:p>
             <a:r>
-              <a:rPr lang="en-US" dirty="0">
+              <a:rPr lang="en-US">
                 <a:solidFill>
                   <a:schemeClr val="accent1"/>
                 </a:solidFill>
@@ -7434,40 +7574,40 @@
               <a:buNone/>
             </a:pPr>
             <a:r>
-              <a:rPr lang="en-US" sz="2000" dirty="0">
+              <a:rPr lang="en-US" sz="2000">
                 <a:cs typeface="Calibri" panose="020F0502020204030204"/>
               </a:rPr>
               <a:t>1. </a:t>
             </a:r>
             <a:r>
-              <a:rPr lang="en-US" sz="2000" b="1" dirty="0">
+              <a:rPr lang="en-US" sz="2000" b="1">
                 <a:ea typeface="+mn-lt"/>
                 <a:cs typeface="+mn-lt"/>
               </a:rPr>
               <a:t>Show,</a:t>
             </a:r>
             <a:r>
-              <a:rPr lang="en-US" sz="2000" dirty="0">
+              <a:rPr lang="en-US" sz="2000">
                 <a:ea typeface="+mn-lt"/>
                 <a:cs typeface="+mn-lt"/>
               </a:rPr>
               <a:t> based on the flux with horizontal distance from a constant head boundary, </a:t>
             </a:r>
             <a:r>
-              <a:rPr lang="en-US" sz="2000" b="1" dirty="0">
+              <a:rPr lang="en-US" sz="2000" b="1">
                 <a:ea typeface="+mn-lt"/>
                 <a:cs typeface="+mn-lt"/>
               </a:rPr>
               <a:t>that the model is steady state</a:t>
             </a:r>
             <a:r>
-              <a:rPr lang="en-US" sz="2000" dirty="0">
+              <a:rPr lang="en-US" sz="2000">
                 <a:ea typeface="+mn-lt"/>
                 <a:cs typeface="+mn-lt"/>
               </a:rPr>
               <a:t>.</a:t>
             </a:r>
-            <a:endParaRPr lang="en-US" dirty="0">
+            <a:endParaRPr lang="en-US">
               <a:ea typeface="+mn-lt"/>
               <a:cs typeface="+mn-lt"/>
             </a:endParaRPr>
@@ -7477,7 +7617,7 @@
               <a:buNone/>
             </a:pPr>
             <a:r>
-              <a:rPr lang="en-US" sz="2000" dirty="0">
+              <a:rPr lang="en-US" sz="2000">
                 <a:ea typeface="+mn-lt"/>
                 <a:cs typeface="+mn-lt"/>
               </a:rPr>
@@ -7489,7 +7629,7 @@
               <a:buNone/>
             </a:pPr>
             <a:r>
-              <a:rPr lang="en-US" sz="2000" dirty="0">
+              <a:rPr lang="en-US" sz="2000">
                 <a:ea typeface="+mn-lt"/>
                 <a:cs typeface="+mn-lt"/>
               </a:rPr>
@@ -7500,7 +7640,7 @@
             <a:pPr marL="0" indent="0">
               <a:buNone/>
             </a:pPr>
-            <a:endParaRPr lang="en-US" sz="2000" dirty="0">
+            <a:endParaRPr lang="en-US" sz="2000">
               <a:cs typeface="Calibri"/>
             </a:endParaRPr>
           </a:p>
@@ -7768,16 +7908,16 @@
               <a:buChar char="•"/>
             </a:pPr>
             <a:r>
-              <a:rPr lang="en-US" sz="1600" dirty="0">
+              <a:rPr lang="en-US" sz="1600">
                 <a:cs typeface="Calibri"/>
               </a:rPr>
               <a:t>From the previous assignment, we know that for 1-D flow flux will be constant along a flux path. </a:t>
             </a:r>
             <a:r>
-              <a:rPr lang="en-US" sz="1600" dirty="0"/>
+              <a:rPr lang="en-US" sz="1600"/>
               <a:t>No change in storage anywhere.  </a:t>
             </a:r>
-            <a:endParaRPr lang="en-US" sz="1600" dirty="0">
+            <a:endParaRPr lang="en-US" sz="1600">
               <a:cs typeface="Calibri"/>
             </a:endParaRPr>
           </a:p>
@@ -7787,7 +7927,7 @@
               <a:buChar char="•"/>
             </a:pPr>
             <a:r>
-              <a:rPr lang="en-US" sz="1600" b="1" dirty="0">
+              <a:rPr lang="en-US" sz="1600" b="1">
                 <a:cs typeface="Calibri"/>
               </a:rPr>
               <a:t>Show that flux is unchanging with distance. </a:t>
@@ -7799,7 +7939,7 @@
               <a:buChar char="•"/>
             </a:pPr>
             <a:r>
-              <a:rPr lang="en-US" sz="1600" b="1" dirty="0">
+              <a:rPr lang="en-US" sz="1600" b="1">
                 <a:cs typeface="Calibri"/>
               </a:rPr>
               <a:t>How did you account for the fact that the heads are calculated in the center of the cell (node) and the K values are defined over each cell?</a:t>
@@ -7855,7 +7995,7 @@
           </a:lstStyle>
           <a:p>
             <a:r>
-              <a:rPr lang="en-US" b="1" dirty="0">
+              <a:rPr lang="en-US" b="1">
                 <a:solidFill>
                   <a:srgbClr val="0070C0"/>
                 </a:solidFill>
@@ -7863,7 +8003,7 @@
               </a:rPr>
               <a:t>Challenge Question (1)</a:t>
             </a:r>
-            <a:endParaRPr lang="en-US" b="1" dirty="0">
+            <a:endParaRPr lang="en-US" b="1">
               <a:solidFill>
                 <a:srgbClr val="0070C0"/>
               </a:solidFill>
@@ -7900,7 +8040,7 @@
           <a:lstStyle/>
           <a:p>
             <a:r>
-              <a:rPr lang="en-US" b="1" dirty="0">
+              <a:rPr lang="en-US" b="1">
                 <a:solidFill>
                   <a:schemeClr val="accent1"/>
                 </a:solidFill>
@@ -7908,7 +8048,7 @@
               </a:rPr>
               <a:t>Breakout Room Topic - Coming Up! (Room 2)</a:t>
             </a:r>
-            <a:endParaRPr lang="en-US" b="1" dirty="0">
+            <a:endParaRPr lang="en-US" b="1">
               <a:solidFill>
                 <a:schemeClr val="accent1"/>
               </a:solidFill>
@@ -7978,7 +8118,7 @@
               <a:buNone/>
             </a:pPr>
             <a:r>
-              <a:rPr lang="en-US" dirty="0">
+              <a:rPr lang="en-US">
                 <a:cs typeface="Calibri" panose="020F0502020204030204"/>
               </a:rPr>
               <a:t>2a. Show the steady state head contour in plan view for the heterogeneous (zones in series) condition.  </a:t>
@@ -7989,20 +8129,20 @@
               <a:buNone/>
             </a:pPr>
             <a:r>
-              <a:rPr lang="en-US" b="1" dirty="0">
+              <a:rPr lang="en-US" b="1">
                 <a:ea typeface="+mn-lt"/>
                 <a:cs typeface="+mn-lt"/>
               </a:rPr>
               <a:t>Use this plot to defend a contention that flow is 1D.</a:t>
             </a:r>
             <a:r>
-              <a:rPr lang="en-US" dirty="0">
+              <a:rPr lang="en-US">
                 <a:ea typeface="+mn-lt"/>
                 <a:cs typeface="+mn-lt"/>
               </a:rPr>
               <a:t> </a:t>
             </a:r>
-            <a:endParaRPr lang="en-US" dirty="0"/>
+            <a:endParaRPr lang="en-US"/>
           </a:p>
         </p:txBody>
       </p:sp>
@@ -8227,7 +8367,7 @@
             <a:lstStyle/>
             <a:p>
               <a:r>
-                <a:rPr lang="en-US" dirty="0">
+                <a:rPr lang="en-US">
                   <a:solidFill>
                     <a:srgbClr val="FFC000"/>
                   </a:solidFill>
@@ -8286,7 +8426,7 @@
           </a:lstStyle>
           <a:p>
             <a:r>
-              <a:rPr lang="en-US" b="1" dirty="0">
+              <a:rPr lang="en-US" b="1">
                 <a:solidFill>
                   <a:srgbClr val="0070C0"/>
                 </a:solidFill>
@@ -8294,7 +8434,7 @@
               </a:rPr>
               <a:t>Challenge Question (2)</a:t>
             </a:r>
-            <a:endParaRPr lang="en-US" b="1" dirty="0">
+            <a:endParaRPr lang="en-US" b="1">
               <a:solidFill>
                 <a:srgbClr val="0070C0"/>
               </a:solidFill>
@@ -8336,7 +8476,7 @@
           <a:lstStyle/>
           <a:p>
             <a:r>
-              <a:rPr lang="en-US" dirty="0"/>
+              <a:rPr lang="en-US"/>
               <a:t>Flow paths will trace perpendicular to head distribution contours</a:t>
             </a:r>
           </a:p>
@@ -8399,7 +8539,7 @@
           <a:lstStyle/>
           <a:p>
             <a:r>
-              <a:rPr lang="en-US" b="1" dirty="0">
+              <a:rPr lang="en-US" b="1">
                 <a:solidFill>
                   <a:srgbClr val="0070C0"/>
                 </a:solidFill>
@@ -8407,7 +8547,7 @@
               </a:rPr>
               <a:t>Challenge Question (2)</a:t>
             </a:r>
-            <a:endParaRPr lang="en-US" b="1" dirty="0">
+            <a:endParaRPr lang="en-US" b="1">
               <a:solidFill>
                 <a:srgbClr val="0070C0"/>
               </a:solidFill>
@@ -8447,20 +8587,20 @@
               <a:buNone/>
             </a:pPr>
             <a:r>
-              <a:rPr lang="en-US" dirty="0">
+              <a:rPr lang="en-US">
                 <a:ea typeface="+mn-lt"/>
                 <a:cs typeface="+mn-lt"/>
               </a:rPr>
               <a:t>2b. </a:t>
             </a:r>
             <a:r>
-              <a:rPr lang="en-US" b="1" dirty="0">
+              <a:rPr lang="en-US" b="1">
                 <a:ea typeface="+mn-lt"/>
                 <a:cs typeface="+mn-lt"/>
               </a:rPr>
               <a:t>Use the results to explain WHY the equivalent hydraulic conductivity, Keq, is closer to the lower of the two K values.</a:t>
             </a:r>
-            <a:endParaRPr lang="en-US" b="1" dirty="0"/>
+            <a:endParaRPr lang="en-US" b="1"/>
           </a:p>
         </p:txBody>
       </p:sp>
@@ -8523,7 +8663,7 @@
           <a:lstStyle/>
           <a:p>
             <a:r>
-              <a:rPr lang="en-US" b="1" dirty="0">
+              <a:rPr lang="en-US" b="1">
                 <a:solidFill>
                   <a:srgbClr val="C00000"/>
                 </a:solidFill>
@@ -8537,7 +8677,7 @@
               <a:buChar char="•"/>
             </a:pPr>
             <a:r>
-              <a:rPr lang="en-US" dirty="0"/>
+              <a:rPr lang="en-US"/>
               <a:t>From Darcy: we know that we have a certain amount of energy to dispel through a system.   Here we are requiring same flow through whole system due to steady state conditions.  </a:t>
             </a:r>
           </a:p>
@@ -8547,7 +8687,7 @@
               <a:buChar char="•"/>
             </a:pPr>
             <a:r>
-              <a:rPr lang="en-US" dirty="0"/>
+              <a:rPr lang="en-US"/>
               <a:t>Keq is controlled by the layer where more energy is used to move through that layer.</a:t>
             </a:r>
           </a:p>
@@ -8557,7 +8697,7 @@
               <a:buChar char="•"/>
             </a:pPr>
             <a:r>
-              <a:rPr lang="en-US" dirty="0"/>
+              <a:rPr lang="en-US"/>
               <a:t>The energy is related to the square of the gradient.  Therefore the energy loss is larger in the low k medium, which has a higher gradient.  </a:t>
             </a:r>
           </a:p>
@@ -8567,12 +8707,12 @@
               <a:buChar char="•"/>
             </a:pPr>
             <a:r>
-              <a:rPr lang="en-US" dirty="0"/>
+              <a:rPr lang="en-US"/>
               <a:t>In our model, we are forcing the energy through the low K area where it is losing a lot of energy.</a:t>
             </a:r>
           </a:p>
           <a:p>
-            <a:endParaRPr lang="en-US" dirty="0"/>
+            <a:endParaRPr lang="en-US"/>
           </a:p>
         </p:txBody>
       </p:sp>
@@ -8605,7 +8745,7 @@
           <a:lstStyle/>
           <a:p>
             <a:r>
-              <a:rPr lang="en-US" b="1" dirty="0">
+              <a:rPr lang="en-US" b="1">
                 <a:solidFill>
                   <a:srgbClr val="C00000"/>
                 </a:solidFill>
@@ -8646,7 +8786,7 @@
           <a:lstStyle/>
           <a:p>
             <a:r>
-              <a:rPr lang="en-US" sz="1400" dirty="0">
+              <a:rPr lang="en-US" sz="1400">
                 <a:solidFill>
                   <a:schemeClr val="bg1"/>
                 </a:solidFill>
@@ -8765,7 +8905,7 @@
           <a:lstStyle/>
           <a:p>
             <a:r>
-              <a:rPr lang="en-US" b="1" dirty="0">
+              <a:rPr lang="en-US" b="1">
                 <a:solidFill>
                   <a:schemeClr val="accent1"/>
                 </a:solidFill>
@@ -8773,7 +8913,7 @@
               </a:rPr>
               <a:t>Breakout Room Topic - Coming Up! (Room 3)</a:t>
             </a:r>
-            <a:endParaRPr lang="en-US" b="1" dirty="0">
+            <a:endParaRPr lang="en-US" b="1">
               <a:solidFill>
                 <a:schemeClr val="accent1"/>
               </a:solidFill>
@@ -8843,21 +8983,21 @@
               <a:buNone/>
             </a:pPr>
             <a:r>
-              <a:rPr lang="en-US" dirty="0">
+              <a:rPr lang="en-US">
                 <a:ea typeface="+mn-lt"/>
                 <a:cs typeface="+mn-lt"/>
               </a:rPr>
               <a:t>3a. </a:t>
             </a:r>
             <a:r>
-              <a:rPr lang="en-US" b="1" dirty="0">
+              <a:rPr lang="en-US" b="1">
                 <a:ea typeface="+mn-lt"/>
                 <a:cs typeface="+mn-lt"/>
               </a:rPr>
               <a:t>What can you learn based on your explanation of what controls the effective K for a 1D flow system now that you are applying it to a 2D system?</a:t>
             </a:r>
             <a:r>
-              <a:rPr lang="en-US" dirty="0">
+              <a:rPr lang="en-US">
                 <a:ea typeface="+mn-lt"/>
                 <a:cs typeface="+mn-lt"/>
               </a:rPr>
@@ -8868,7 +9008,7 @@
             <a:pPr marL="0" indent="0">
               <a:buNone/>
             </a:pPr>
-            <a:endParaRPr lang="en-US" dirty="0">
+            <a:endParaRPr lang="en-US">
               <a:ea typeface="+mn-lt"/>
               <a:cs typeface="+mn-lt"/>
             </a:endParaRPr>
@@ -8877,7 +9017,7 @@
             <a:pPr marL="0" indent="0">
               <a:buNone/>
             </a:pPr>
-            <a:endParaRPr lang="en-US" b="1" dirty="0">
+            <a:endParaRPr lang="en-US" b="1">
               <a:ea typeface="+mn-lt"/>
               <a:cs typeface="+mn-lt"/>
             </a:endParaRPr>
@@ -8916,36 +9056,36 @@
           <a:lstStyle/>
           <a:p>
             <a:r>
-              <a:rPr lang="en-US" sz="2800" dirty="0">
+              <a:rPr lang="en-US" sz="2800">
                 <a:cs typeface="Calibri"/>
               </a:rPr>
               <a:t>a. The 2D flow system matches our intuition about energy and K. </a:t>
             </a:r>
-            <a:endParaRPr lang="en-US" sz="2800" b="1" dirty="0">
+            <a:endParaRPr lang="en-US" sz="2800" b="1">
               <a:cs typeface="Calibri"/>
             </a:endParaRPr>
           </a:p>
           <a:p>
-            <a:endParaRPr lang="en-US" sz="2800" dirty="0">
+            <a:endParaRPr lang="en-US" sz="2800">
               <a:cs typeface="Calibri"/>
             </a:endParaRPr>
           </a:p>
           <a:p>
             <a:r>
-              <a:rPr lang="en-US" sz="2800" b="1" dirty="0">
+              <a:rPr lang="en-US" sz="2800" b="1">
                 <a:cs typeface="Calibri"/>
               </a:rPr>
               <a:t>The gradient is steeper in lo-K inclusion</a:t>
             </a:r>
           </a:p>
           <a:p>
-            <a:endParaRPr lang="en-US" sz="2800" b="1" dirty="0">
+            <a:endParaRPr lang="en-US" sz="2800" b="1">
               <a:cs typeface="Calibri"/>
             </a:endParaRPr>
           </a:p>
           <a:p>
             <a:r>
-              <a:rPr lang="en-US" sz="2800" dirty="0">
+              <a:rPr lang="en-US" sz="2800">
                 <a:cs typeface="Calibri"/>
               </a:rPr>
               <a:t>i.e. greater energy loss relative to the Hi-K media around it</a:t>
@@ -8969,8 +9109,8 @@
         </p:nvGrpSpPr>
         <p:grpSpPr>
           <a:xfrm>
-            <a:off x="6745813" y="2469325"/>
-            <a:ext cx="4886696" cy="3900964"/>
+            <a:off x="6886782" y="2633098"/>
+            <a:ext cx="4888602" cy="3891972"/>
             <a:chOff x="6916728" y="3567472"/>
             <a:chExt cx="3716216" cy="2966590"/>
           </a:xfrm>
@@ -9100,7 +9240,7 @@
           </a:lstStyle>
           <a:p>
             <a:r>
-              <a:rPr lang="en-US" b="1" dirty="0">
+              <a:rPr lang="en-US" b="1">
                 <a:solidFill>
                   <a:srgbClr val="0070C0"/>
                 </a:solidFill>
@@ -9108,7 +9248,7 @@
               </a:rPr>
               <a:t>Challenge Question (3)</a:t>
             </a:r>
-            <a:endParaRPr lang="en-US" b="1" dirty="0">
+            <a:endParaRPr lang="en-US" b="1">
               <a:solidFill>
                 <a:srgbClr val="0070C0"/>
               </a:solidFill>
@@ -10064,7 +10204,7 @@
           </a:lstStyle>
           <a:p>
             <a:r>
-              <a:rPr lang="en-US" b="1" dirty="0">
+              <a:rPr lang="en-US" b="1">
                 <a:solidFill>
                   <a:srgbClr val="0070C0"/>
                 </a:solidFill>
@@ -10072,7 +10212,7 @@
               </a:rPr>
               <a:t>Challenge Question (3)</a:t>
             </a:r>
-            <a:endParaRPr lang="en-US" b="1" dirty="0">
+            <a:endParaRPr lang="en-US" b="1">
               <a:solidFill>
                 <a:srgbClr val="0070C0"/>
               </a:solidFill>
@@ -10102,8 +10242,8 @@
         </p:blipFill>
         <p:spPr>
           <a:xfrm>
-            <a:off x="7748008" y="1804168"/>
-            <a:ext cx="2461464" cy="1626773"/>
+            <a:off x="9051742" y="1429121"/>
+            <a:ext cx="2842464" cy="1876804"/>
           </a:xfrm>
           <a:prstGeom prst="rect">
             <a:avLst/>
@@ -10946,7 +11086,7 @@
           </a:lstStyle>
           <a:p>
             <a:r>
-              <a:rPr lang="en-US" b="1" dirty="0">
+              <a:rPr lang="en-US" b="1">
                 <a:solidFill>
                   <a:srgbClr val="0070C0"/>
                 </a:solidFill>
@@ -10954,7 +11094,7 @@
               </a:rPr>
               <a:t>Challenge Question (3)</a:t>
             </a:r>
-            <a:endParaRPr lang="en-US" b="1" dirty="0">
+            <a:endParaRPr lang="en-US" b="1">
               <a:solidFill>
                 <a:srgbClr val="0070C0"/>
               </a:solidFill>
@@ -11069,7 +11209,7 @@
           <a:lstStyle/>
           <a:p>
             <a:r>
-              <a:rPr lang="en-US" b="1" dirty="0">
+              <a:rPr lang="en-US" b="1">
                 <a:solidFill>
                   <a:schemeClr val="accent1"/>
                 </a:solidFill>
@@ -11077,7 +11217,7 @@
               </a:rPr>
               <a:t>Breakout Room Topic - Coming Up! (Room 4)</a:t>
             </a:r>
-            <a:endParaRPr lang="en-US" b="1" dirty="0">
+            <a:endParaRPr lang="en-US" b="1">
               <a:solidFill>
                 <a:schemeClr val="accent1"/>
               </a:solidFill>
@@ -11144,7 +11284,7 @@
           <a:lstStyle/>
           <a:p>
             <a:r>
-              <a:rPr lang="en-US" sz="4800" b="1" dirty="0">
+              <a:rPr lang="en-US" sz="4800" b="1">
                 <a:solidFill>
                   <a:schemeClr val="accent1"/>
                 </a:solidFill>
@@ -11358,7 +11498,7 @@
               </a:spcAft>
             </a:pPr>
             <a:r>
-              <a:rPr lang="en-US" sz="1600" b="1" u="sng" dirty="0">
+              <a:rPr lang="en-US" sz="1600" b="1" u="sng">
                 <a:solidFill>
                   <a:schemeClr val="tx2"/>
                 </a:solidFill>
@@ -11368,7 +11508,7 @@
               <a:t>Room 1:</a:t>
             </a:r>
             <a:r>
-              <a:rPr lang="en-US" sz="1600" b="1" dirty="0">
+              <a:rPr lang="en-US" sz="1600" b="1">
                 <a:solidFill>
                   <a:schemeClr val="accent5"/>
                 </a:solidFill>
@@ -11378,13 +11518,13 @@
               <a:t>  </a:t>
             </a:r>
             <a:r>
-              <a:rPr lang="en-US" sz="1600" dirty="0">
+              <a:rPr lang="en-US" sz="1600">
                 <a:ea typeface="+mn-lt"/>
                 <a:cs typeface="+mn-lt"/>
               </a:rPr>
               <a:t>Technical Struggles Help Group</a:t>
             </a:r>
-            <a:endParaRPr lang="en-US" sz="1600" dirty="0"/>
+            <a:endParaRPr lang="en-US" sz="1600"/>
           </a:p>
           <a:p>
             <a:pPr marL="858838" indent="-803275" algn="l">
@@ -11399,7 +11539,7 @@
               </a:spcAft>
             </a:pPr>
             <a:r>
-              <a:rPr lang="en-US" sz="1600" b="1" u="sng" dirty="0">
+              <a:rPr lang="en-US" sz="1600" b="1" u="sng">
                 <a:solidFill>
                   <a:schemeClr val="tx2"/>
                 </a:solidFill>
@@ -11407,7 +11547,7 @@
               <a:t>Room 2:</a:t>
             </a:r>
             <a:r>
-              <a:rPr lang="en-US" sz="1600" b="1" dirty="0">
+              <a:rPr lang="en-US" sz="1600" b="1">
                 <a:solidFill>
                   <a:schemeClr val="accent5"/>
                 </a:solidFill>
@@ -11415,21 +11555,21 @@
               <a:t>  </a:t>
             </a:r>
             <a:r>
-              <a:rPr lang="en-US" sz="1600" dirty="0"/>
+              <a:rPr lang="en-US" sz="1600"/>
               <a:t>What is the form of the equation used to calculate q </a:t>
             </a:r>
             <a:r>
-              <a:rPr lang="en-US" sz="1600" dirty="0">
+              <a:rPr lang="en-US" sz="1600">
                 <a:ea typeface="+mn-lt"/>
                 <a:cs typeface="+mn-lt"/>
               </a:rPr>
               <a:t>for each cell </a:t>
             </a:r>
             <a:r>
-              <a:rPr lang="en-US" sz="1600" dirty="0"/>
+              <a:rPr lang="en-US" sz="1600"/>
               <a:t>in a 2D model (from Challenge Question 1)? How code it into excel (or other platform)? Were you able to show 'steady state' in your figure? Why or why not? </a:t>
             </a:r>
-            <a:endParaRPr lang="en-US" sz="1600" dirty="0">
+            <a:endParaRPr lang="en-US" sz="1600">
               <a:cs typeface="Calibri"/>
             </a:endParaRPr>
           </a:p>
@@ -11446,7 +11586,7 @@
               </a:spcAft>
             </a:pPr>
             <a:r>
-              <a:rPr lang="en-US" sz="1600" b="1" u="sng" dirty="0">
+              <a:rPr lang="en-US" sz="1600" b="1" u="sng">
                 <a:solidFill>
                   <a:schemeClr val="tx2"/>
                 </a:solidFill>
@@ -11454,7 +11594,7 @@
               <a:t>Room 3:</a:t>
             </a:r>
             <a:r>
-              <a:rPr lang="en-US" sz="1600" b="1" dirty="0">
+              <a:rPr lang="en-US" sz="1600" b="1">
                 <a:solidFill>
                   <a:schemeClr val="accent5"/>
                 </a:solidFill>
@@ -11462,7 +11602,7 @@
               <a:t>  </a:t>
             </a:r>
             <a:r>
-              <a:rPr lang="en-US" sz="1600" dirty="0"/>
+              <a:rPr lang="en-US" sz="1600"/>
               <a:t>Explain why Keq in Case 2 is closer to the low-K value, but cannot be calculated in the same way in the 2-D flow model (Case 3). Explain this in terms of energy and flow paths. </a:t>
             </a:r>
           </a:p>
@@ -11479,7 +11619,7 @@
               </a:spcAft>
             </a:pPr>
             <a:r>
-              <a:rPr lang="en-US" sz="1600" dirty="0"/>
+              <a:rPr lang="en-US" sz="1600"/>
               <a:t>         Bonus1: How might we calculate Keq in the 2-D flow model (Case 3)?</a:t>
             </a:r>
           </a:p>
@@ -11496,7 +11636,7 @@
               </a:spcAft>
             </a:pPr>
             <a:r>
-              <a:rPr lang="en-US" sz="1600" dirty="0">
+              <a:rPr lang="en-US" sz="1600">
                 <a:cs typeface="Calibri"/>
               </a:rPr>
               <a:t>         Bonus2: How would the 2-D flow model (Case 3) look with a Hi-K inclusion?</a:t>
@@ -11515,13 +11655,13 @@
               </a:spcAft>
             </a:pPr>
             <a:r>
-              <a:rPr lang="en-US" sz="1200" dirty="0">
+              <a:rPr lang="en-US" sz="1200">
                 <a:cs typeface="Calibri"/>
               </a:rPr>
               <a:t>* Hint: Look at GitHub article for more info: </a:t>
             </a:r>
             <a:r>
-              <a:rPr lang="en-US" sz="1200" dirty="0">
+              <a:rPr lang="en-US" sz="1200">
                 <a:ea typeface="+mn-lt"/>
                 <a:cs typeface="+mn-lt"/>
                 <a:hlinkClick r:id="rId3"/>
@@ -11529,7 +11669,7 @@
               <a:t>https://github.com/GW-modelling-Spring2021/Course_Materials/blob/main/Assignments/HW1_BoxModel_Excel/Moghaddam_WRR_submitted.pdf</a:t>
             </a:r>
             <a:r>
-              <a:rPr lang="en-US" sz="1200" dirty="0">
+              <a:rPr lang="en-US" sz="1200">
                 <a:ea typeface="+mn-lt"/>
                 <a:cs typeface="+mn-lt"/>
               </a:rPr>
@@ -11549,7 +11689,7 @@
               </a:spcAft>
             </a:pPr>
             <a:r>
-              <a:rPr lang="en-US" sz="1600" b="1" u="sng" dirty="0">
+              <a:rPr lang="en-US" sz="1600" b="1" u="sng">
                 <a:solidFill>
                   <a:schemeClr val="tx2"/>
                 </a:solidFill>
@@ -11557,7 +11697,7 @@
               <a:t>Room 4:</a:t>
             </a:r>
             <a:r>
-              <a:rPr lang="en-US" sz="1600" b="1" dirty="0">
+              <a:rPr lang="en-US" sz="1600" b="1">
                 <a:solidFill>
                   <a:schemeClr val="accent5"/>
                 </a:solidFill>
@@ -11565,21 +11705,21 @@
               <a:t>  </a:t>
             </a:r>
             <a:r>
-              <a:rPr lang="en-US" sz="1600" dirty="0">
+              <a:rPr lang="en-US" sz="1600">
                 <a:ea typeface="+mn-lt"/>
                 <a:cs typeface="+mn-lt"/>
               </a:rPr>
               <a:t>For steady state conditions, there are equivalent Type I and Type II boundary conditions. What would the Type II boundary condition be that would result in the same </a:t>
             </a:r>
             <a:r>
-              <a:rPr lang="en-US" sz="1600" dirty="0" err="1">
+              <a:rPr lang="en-US" sz="1600" err="1">
                 <a:ea typeface="+mn-lt"/>
                 <a:cs typeface="+mn-lt"/>
               </a:rPr>
               <a:t>equipotentials</a:t>
             </a:r>
             <a:r>
-              <a:rPr lang="en-US" sz="1600" dirty="0">
+              <a:rPr lang="en-US" sz="1600">
                 <a:ea typeface="+mn-lt"/>
                 <a:cs typeface="+mn-lt"/>
               </a:rPr>
@@ -11599,7 +11739,7 @@
               </a:spcAft>
             </a:pPr>
             <a:r>
-              <a:rPr lang="en-US" sz="1600" b="1" u="sng" dirty="0">
+              <a:rPr lang="en-US" sz="1600" b="1" u="sng">
                 <a:solidFill>
                   <a:srgbClr val="C00000"/>
                 </a:solidFill>
@@ -11620,13 +11760,13 @@
               </a:spcAft>
             </a:pPr>
             <a:r>
-              <a:rPr lang="en-US" sz="1600" dirty="0">
+              <a:rPr lang="en-US" sz="1600">
                 <a:ea typeface="+mn-lt"/>
                 <a:cs typeface="+mn-lt"/>
               </a:rPr>
               <a:t>- If you want to establish purely horizontal flow, what (specifically) should be defined as constant along the constant head boundaries?</a:t>
             </a:r>
-            <a:endParaRPr lang="en-US" sz="1600" dirty="0"/>
+            <a:endParaRPr lang="en-US" sz="1600"/>
           </a:p>
           <a:p>
             <a:pPr algn="l">
@@ -11641,13 +11781,13 @@
               </a:spcAft>
             </a:pPr>
             <a:r>
-              <a:rPr lang="en-US" sz="1600" dirty="0">
+              <a:rPr lang="en-US" sz="1600">
                 <a:ea typeface="+mn-lt"/>
                 <a:cs typeface="+mn-lt"/>
               </a:rPr>
               <a:t>- What is an equipotential? Assuming that the medium is isotropic (why?) and that flow is horizontal, how can you track the path of a water particle through the domain?</a:t>
             </a:r>
-            <a:endParaRPr lang="en-US" sz="1600" dirty="0"/>
+            <a:endParaRPr lang="en-US" sz="1600"/>
           </a:p>
           <a:p>
             <a:pPr algn="l">
@@ -11658,7 +11798,7 @@
                 <a:spcPts val="600"/>
               </a:spcBef>
             </a:pPr>
-            <a:endParaRPr lang="en-US" sz="1000" dirty="0">
+            <a:endParaRPr lang="en-US" sz="1000">
               <a:cs typeface="Calibri"/>
             </a:endParaRPr>
           </a:p>
@@ -11671,7 +11811,7 @@
                 <a:spcPts val="600"/>
               </a:spcBef>
             </a:pPr>
-            <a:endParaRPr lang="en-US" sz="1000" dirty="0"/>
+            <a:endParaRPr lang="en-US" sz="1000"/>
           </a:p>
         </p:txBody>
       </p:sp>
@@ -12077,9 +12217,17 @@
         </p:nvSpPr>
         <p:spPr/>
         <p:txBody>
-          <a:bodyPr/>
+          <a:bodyPr vert="horz" lIns="91440" tIns="45720" rIns="91440" bIns="45720" rtlCol="0" anchor="t">
+            <a:normAutofit/>
+          </a:bodyPr>
           <a:lstStyle/>
           <a:p>
+            <a:r>
+              <a:rPr lang="en-US">
+                <a:cs typeface="Calibri"/>
+              </a:rPr>
+              <a:t>You don't want to calculate Keq in multiple directions by hand</a:t>
+            </a:r>
             <a:endParaRPr lang="en-US"/>
           </a:p>
         </p:txBody>
@@ -12136,7 +12284,7 @@
           <a:lstStyle/>
           <a:p>
             <a:r>
-              <a:rPr lang="en-US" b="1" dirty="0">
+              <a:rPr lang="en-US" b="1">
                 <a:solidFill>
                   <a:schemeClr val="accent1"/>
                 </a:solidFill>
@@ -12144,7 +12292,7 @@
               </a:rPr>
               <a:t>Outline</a:t>
             </a:r>
-            <a:endParaRPr lang="en-US" b="1" dirty="0">
+            <a:endParaRPr lang="en-US" b="1">
               <a:solidFill>
                 <a:schemeClr val="accent1"/>
               </a:solidFill>
@@ -12181,19 +12329,19 @@
           <a:lstStyle/>
           <a:p>
             <a:r>
-              <a:rPr lang="en-US" dirty="0">
+              <a:rPr lang="en-US">
                 <a:ea typeface="+mn-lt"/>
                 <a:cs typeface="+mn-lt"/>
               </a:rPr>
               <a:t>The Challenge</a:t>
             </a:r>
-            <a:endParaRPr lang="en-US" dirty="0">
+            <a:endParaRPr lang="en-US">
               <a:cs typeface="Calibri"/>
             </a:endParaRPr>
           </a:p>
           <a:p>
             <a:r>
-              <a:rPr lang="en-US" dirty="0">
+              <a:rPr lang="en-US">
                 <a:cs typeface="Calibri"/>
               </a:rPr>
               <a:t>How are we feeling about MODFLOW right now?</a:t>
@@ -12201,7 +12349,7 @@
           </a:p>
           <a:p>
             <a:r>
-              <a:rPr lang="en-US" dirty="0">
+              <a:rPr lang="en-US">
                 <a:cs typeface="Calibri"/>
               </a:rPr>
               <a:t>The 'Conceptual' Box Model</a:t>
@@ -12209,7 +12357,7 @@
           </a:p>
           <a:p>
             <a:r>
-              <a:rPr lang="en-US" dirty="0">
+              <a:rPr lang="en-US">
                 <a:cs typeface="Calibri"/>
               </a:rPr>
               <a:t>The 'Key' Figures</a:t>
@@ -12217,25 +12365,25 @@
           </a:p>
           <a:p>
             <a:r>
-              <a:rPr lang="en-US" dirty="0">
+              <a:rPr lang="en-US">
                 <a:cs typeface="Calibri"/>
               </a:rPr>
               <a:t>Technical</a:t>
             </a:r>
             <a:r>
-              <a:rPr lang="en-US" dirty="0">
+              <a:rPr lang="en-US">
                 <a:ea typeface="+mn-lt"/>
                 <a:cs typeface="+mn-lt"/>
               </a:rPr>
               <a:t> Struggle Share and Care</a:t>
             </a:r>
-            <a:endParaRPr lang="en-US" dirty="0">
+            <a:endParaRPr lang="en-US">
               <a:cs typeface="Calibri"/>
             </a:endParaRPr>
           </a:p>
           <a:p>
             <a:r>
-              <a:rPr lang="en-US" dirty="0">
+              <a:rPr lang="en-US">
                 <a:cs typeface="Calibri"/>
               </a:rPr>
               <a:t>The Challenge Questions</a:t>
@@ -12243,7 +12391,7 @@
           </a:p>
           <a:p>
             <a:r>
-              <a:rPr lang="en-US" dirty="0">
+              <a:rPr lang="en-US">
                 <a:cs typeface="Calibri"/>
               </a:rPr>
               <a:t>Breakout Groups</a:t>
@@ -12251,14 +12399,14 @@
           </a:p>
           <a:p>
             <a:r>
-              <a:rPr lang="en-US" dirty="0">
+              <a:rPr lang="en-US">
                 <a:cs typeface="Calibri"/>
               </a:rPr>
               <a:t>Regroup</a:t>
             </a:r>
           </a:p>
           <a:p>
-            <a:endParaRPr lang="en-US" dirty="0">
+            <a:endParaRPr lang="en-US">
               <a:cs typeface="Calibri"/>
             </a:endParaRPr>
           </a:p>
@@ -12322,7 +12470,7 @@
           <a:p>
             <a:pPr algn="l"/>
             <a:r>
-              <a:rPr lang="en-US" b="1" dirty="0">
+              <a:rPr lang="en-US" b="1">
                 <a:solidFill>
                   <a:schemeClr val="accent1"/>
                 </a:solidFill>
@@ -12371,7 +12519,7 @@
               <a:buChar char="•"/>
             </a:pPr>
             <a:r>
-              <a:rPr lang="en-US" sz="3200" b="1" dirty="0">
+              <a:rPr lang="en-US" sz="3200" b="1">
                 <a:solidFill>
                   <a:srgbClr val="C00000"/>
                 </a:solidFill>
@@ -12393,13 +12541,13 @@
               <a:buChar char="•"/>
             </a:pPr>
             <a:r>
-              <a:rPr lang="en-US" sz="2800" dirty="0">
+              <a:rPr lang="en-US" sz="2800">
                 <a:ea typeface="+mn-lt"/>
                 <a:cs typeface="+mn-lt"/>
               </a:rPr>
               <a:t>MODFLOW files were supplied that model steady state saturated flow through a 3D system for a homogeneous medium. </a:t>
             </a:r>
-            <a:endParaRPr lang="en-US" sz="2800" dirty="0">
+            <a:endParaRPr lang="en-US" sz="2800">
               <a:cs typeface="Calibri" panose="020F0502020204030204"/>
             </a:endParaRPr>
           </a:p>
@@ -12415,7 +12563,7 @@
               <a:buChar char="•"/>
             </a:pPr>
             <a:r>
-              <a:rPr lang="en-US" sz="3200" b="1" dirty="0">
+              <a:rPr lang="en-US" sz="3200" b="1">
                 <a:solidFill>
                   <a:srgbClr val="C00000"/>
                 </a:solidFill>
@@ -12437,7 +12585,7 @@
               <a:buChar char="•"/>
             </a:pPr>
             <a:r>
-              <a:rPr lang="en-US" sz="2800" dirty="0">
+              <a:rPr lang="en-US" sz="2800">
                 <a:ea typeface="+mn-lt"/>
                 <a:cs typeface="+mn-lt"/>
               </a:rPr>
@@ -12456,7 +12604,7 @@
               <a:buChar char="•"/>
             </a:pPr>
             <a:r>
-              <a:rPr lang="en-US" sz="2800" dirty="0">
+              <a:rPr lang="en-US" sz="2800">
                 <a:ea typeface="+mn-lt"/>
                 <a:cs typeface="+mn-lt"/>
               </a:rPr>
@@ -12475,7 +12623,7 @@
               <a:buChar char="•"/>
             </a:pPr>
             <a:r>
-              <a:rPr lang="en-US" sz="2800" dirty="0">
+              <a:rPr lang="en-US" sz="2800">
                 <a:ea typeface="+mn-lt"/>
                 <a:cs typeface="+mn-lt"/>
               </a:rPr>
@@ -12493,7 +12641,7 @@
               <a:buFont typeface="Arial" panose="020B0604020202020204" pitchFamily="34" charset="0"/>
               <a:buChar char="•"/>
             </a:pPr>
-            <a:endParaRPr lang="en-US" sz="2800" dirty="0">
+            <a:endParaRPr lang="en-US" sz="2800">
               <a:cs typeface="Calibri" panose="020F0502020204030204"/>
             </a:endParaRPr>
           </a:p>
@@ -12508,7 +12656,7 @@
               <a:buFont typeface="Arial" panose="020B0604020202020204" pitchFamily="34" charset="0"/>
               <a:buChar char="•"/>
             </a:pPr>
-            <a:endParaRPr lang="en-US" sz="3200" dirty="0">
+            <a:endParaRPr lang="en-US" sz="3200">
               <a:cs typeface="Calibri" panose="020F0502020204030204"/>
             </a:endParaRPr>
           </a:p>
@@ -12720,13 +12868,13 @@
           <a:lstStyle/>
           <a:p>
             <a:r>
-              <a:rPr lang="en-US" dirty="0"/>
+              <a:rPr lang="en-US"/>
               <a:t>Hand-Built</a:t>
             </a:r>
           </a:p>
           <a:p>
             <a:r>
-              <a:rPr lang="en-US" dirty="0"/>
+              <a:rPr lang="en-US"/>
               <a:t>MODFLOW</a:t>
             </a:r>
           </a:p>
@@ -12799,7 +12947,7 @@
               </a:spcAft>
             </a:pPr>
             <a:r>
-              <a:rPr lang="en-US" sz="1600" b="0" i="0" u="none" strike="noStrike" dirty="0">
+              <a:rPr lang="en-US" sz="1600" b="0" i="0" u="none" strike="noStrike">
                 <a:solidFill>
                   <a:srgbClr val="000000"/>
                 </a:solidFill>
@@ -12808,7 +12956,7 @@
               </a:rPr>
               <a:t>Base (BAS) file -</a:t>
             </a:r>
-            <a:endParaRPr lang="en-US" sz="1600" b="0" dirty="0">
+            <a:endParaRPr lang="en-US" sz="1600" b="0">
               <a:effectLst/>
             </a:endParaRPr>
           </a:p>
@@ -12824,7 +12972,7 @@
               <a:buChar char="•"/>
             </a:pPr>
             <a:r>
-              <a:rPr lang="en-US" sz="1600" b="0" i="0" u="none" strike="noStrike" dirty="0">
+              <a:rPr lang="en-US" sz="1600" b="0" i="0" u="none" strike="noStrike">
                 <a:solidFill>
                   <a:srgbClr val="000000"/>
                 </a:solidFill>
@@ -12835,7 +12983,7 @@
             </a:r>
           </a:p>
           <a:p>
-            <a:endParaRPr lang="en-US" sz="1600" dirty="0"/>
+            <a:endParaRPr lang="en-US" sz="1600"/>
           </a:p>
         </p:txBody>
       </p:sp>
@@ -12853,7 +13001,7 @@
         </p:nvGrpSpPr>
         <p:grpSpPr>
           <a:xfrm>
-            <a:off x="2928208" y="2401068"/>
+            <a:off x="2946068" y="2418928"/>
             <a:ext cx="6069361" cy="2140742"/>
             <a:chOff x="1920819" y="2226712"/>
             <a:chExt cx="6069361" cy="2140742"/>
@@ -13004,21 +13152,21 @@
               <a:p>
                 <a:pPr algn="ctr"/>
                 <a:r>
-                  <a:rPr lang="en-US" dirty="0">
+                  <a:rPr lang="en-US">
                     <a:solidFill>
                       <a:schemeClr val="bg1"/>
                     </a:solidFill>
                     <a:cs typeface="Calibri"/>
                   </a:rPr>
-                  <a:t>2500</a:t>
+                  <a:t>2400</a:t>
                 </a:r>
                 <a:r>
-                  <a:rPr lang="en-US" dirty="0">
+                  <a:rPr lang="en-US">
                     <a:cs typeface="Calibri"/>
                   </a:rPr>
                   <a:t> m</a:t>
                 </a:r>
-                <a:endParaRPr lang="en-US" dirty="0"/>
+                <a:endParaRPr lang="en-US"/>
               </a:p>
             </p:txBody>
           </p:sp>
@@ -13297,7 +13445,7 @@
           <a:lstStyle/>
           <a:p>
             <a:pPr algn="ctr"/>
-            <a:endParaRPr lang="en-US" dirty="0"/>
+            <a:endParaRPr lang="en-US"/>
           </a:p>
         </p:txBody>
       </p:sp>
@@ -13393,13 +13541,13 @@
           </a:fontRef>
         </p:style>
         <p:txBody>
-          <a:bodyPr rtlCol="0" anchor="ctr"/>
+          <a:bodyPr lIns="91440" tIns="45720" rIns="91440" bIns="45720" rtlCol="0" anchor="ctr"/>
           <a:lstStyle/>
           <a:p>
             <a:pPr algn="ctr"/>
             <a:r>
-              <a:rPr lang="en-US" dirty="0"/>
-              <a:t>15m/d</a:t>
+              <a:rPr lang="en-US"/>
+              <a:t>15 m</a:t>
             </a:r>
           </a:p>
         </p:txBody>
@@ -13496,13 +13644,13 @@
           </a:fontRef>
         </p:style>
         <p:txBody>
-          <a:bodyPr rtlCol="0" anchor="ctr"/>
+          <a:bodyPr lIns="91440" tIns="45720" rIns="91440" bIns="45720" rtlCol="0" anchor="ctr"/>
           <a:lstStyle/>
           <a:p>
             <a:pPr algn="ctr"/>
             <a:r>
-              <a:rPr lang="en-US" dirty="0"/>
-              <a:t>10m/d</a:t>
+              <a:rPr lang="en-US"/>
+              <a:t>10m</a:t>
             </a:r>
           </a:p>
         </p:txBody>
@@ -13734,7 +13882,7 @@
           <a:lstStyle/>
           <a:p>
             <a:r>
-              <a:rPr lang="en-US" dirty="0"/>
+              <a:rPr lang="en-US"/>
               <a:t>Flow in</a:t>
             </a:r>
           </a:p>
@@ -13844,7 +13992,7 @@
           <a:lstStyle/>
           <a:p>
             <a:r>
-              <a:rPr lang="en-US" dirty="0"/>
+              <a:rPr lang="en-US"/>
               <a:t>Flow out</a:t>
             </a:r>
           </a:p>
@@ -13898,7 +14046,7 @@
           </a:lstStyle>
           <a:p>
             <a:r>
-              <a:rPr lang="en-US" b="1" dirty="0">
+              <a:rPr lang="en-US" b="1">
                 <a:solidFill>
                   <a:schemeClr val="accent1"/>
                 </a:solidFill>
@@ -13909,7 +14057,7 @@
           </a:p>
           <a:p>
             <a:r>
-              <a:rPr lang="en-US" sz="3600" b="1" dirty="0">
+              <a:rPr lang="en-US" sz="3600" b="1">
                 <a:solidFill>
                   <a:srgbClr val="C00000"/>
                 </a:solidFill>
@@ -13917,7 +14065,7 @@
               </a:rPr>
               <a:t>Homogeneous</a:t>
             </a:r>
-            <a:endParaRPr lang="en-US" sz="3600" b="1" dirty="0">
+            <a:endParaRPr lang="en-US" sz="3600" b="1">
               <a:solidFill>
                 <a:srgbClr val="C00000"/>
               </a:solidFill>
@@ -13959,7 +14107,7 @@
           <a:lstStyle/>
           <a:p>
             <a:r>
-              <a:rPr lang="en-US" dirty="0"/>
+              <a:rPr lang="en-US"/>
               <a:t>Given:</a:t>
             </a:r>
           </a:p>
@@ -13969,7 +14117,7 @@
               <a:buChar char="•"/>
             </a:pPr>
             <a:r>
-              <a:rPr lang="en-US" dirty="0"/>
+              <a:rPr lang="en-US"/>
               <a:t>Flat lying</a:t>
             </a:r>
           </a:p>
@@ -13979,7 +14127,7 @@
               <a:buChar char="•"/>
             </a:pPr>
             <a:r>
-              <a:rPr lang="en-US" dirty="0"/>
+              <a:rPr lang="en-US"/>
               <a:t>Top and bottom and two opposite vert. boundaries are no flow</a:t>
             </a:r>
           </a:p>
@@ -13989,7 +14137,7 @@
               <a:buChar char="•"/>
             </a:pPr>
             <a:r>
-              <a:rPr lang="en-US" dirty="0"/>
+              <a:rPr lang="en-US"/>
               <a:t>Each of other faces has constant head</a:t>
             </a:r>
           </a:p>
@@ -14258,7 +14406,7 @@
             <a:lstStyle/>
             <a:p>
               <a:r>
-                <a:rPr lang="en-US" dirty="0">
+                <a:rPr lang="en-US">
                   <a:solidFill>
                     <a:srgbClr val="FF0000"/>
                   </a:solidFill>
@@ -14578,7 +14726,7 @@
           <a:lstStyle/>
           <a:p>
             <a:r>
-              <a:rPr lang="en-US" dirty="0">
+              <a:rPr lang="en-US">
                 <a:highlight>
                   <a:srgbClr val="FFFF00"/>
                 </a:highlight>
@@ -14617,7 +14765,7 @@
           <a:lstStyle/>
           <a:p>
             <a:r>
-              <a:rPr lang="en-US" dirty="0">
+              <a:rPr lang="en-US">
                 <a:highlight>
                   <a:srgbClr val="FFFF00"/>
                 </a:highlight>
@@ -15361,7 +15509,7 @@
                   <a:rPr lang="en-US" dirty="0">
                     <a:cs typeface="Calibri"/>
                   </a:rPr>
-                  <a:t>2500 m</a:t>
+                  <a:t>2400 m</a:t>
                 </a:r>
                 <a:endParaRPr lang="en-US" dirty="0"/>
               </a:p>
@@ -15630,8 +15778,8 @@
           <a:p>
             <a:pPr algn="ctr"/>
             <a:r>
-              <a:rPr lang="en-US" dirty="0"/>
-              <a:t>15m/d</a:t>
+              <a:rPr lang="en-US"/>
+              <a:t>15m</a:t>
             </a:r>
           </a:p>
         </p:txBody>
@@ -15745,7 +15893,7 @@
           <a:lstStyle/>
           <a:p>
             <a:pPr algn="ctr"/>
-            <a:endParaRPr lang="en-US" dirty="0"/>
+            <a:endParaRPr lang="en-US"/>
           </a:p>
         </p:txBody>
       </p:sp>
@@ -15846,8 +15994,8 @@
           <a:p>
             <a:pPr algn="ctr"/>
             <a:r>
-              <a:rPr lang="en-US" dirty="0"/>
-              <a:t>10m/d</a:t>
+              <a:rPr lang="en-US"/>
+              <a:t>10m</a:t>
             </a:r>
           </a:p>
         </p:txBody>
@@ -15956,7 +16104,7 @@
           <a:lstStyle/>
           <a:p>
             <a:r>
-              <a:rPr lang="en-US" dirty="0"/>
+              <a:rPr lang="en-US"/>
               <a:t>Flow in</a:t>
             </a:r>
           </a:p>
@@ -16066,7 +16214,7 @@
           <a:lstStyle/>
           <a:p>
             <a:r>
-              <a:rPr lang="en-US" dirty="0"/>
+              <a:rPr lang="en-US"/>
               <a:t>Flow out</a:t>
             </a:r>
           </a:p>
@@ -16120,7 +16268,7 @@
           </a:lstStyle>
           <a:p>
             <a:r>
-              <a:rPr lang="en-US" b="1" dirty="0">
+              <a:rPr lang="en-US" b="1">
                 <a:solidFill>
                   <a:schemeClr val="accent1"/>
                 </a:solidFill>
@@ -16131,7 +16279,7 @@
           </a:p>
           <a:p>
             <a:r>
-              <a:rPr lang="en-US" sz="3600" b="1" dirty="0">
+              <a:rPr lang="en-US" sz="3600" b="1">
                 <a:solidFill>
                   <a:srgbClr val="C00000"/>
                 </a:solidFill>
@@ -16139,7 +16287,7 @@
               </a:rPr>
               <a:t>Heterogeneous</a:t>
             </a:r>
-            <a:endParaRPr lang="en-US" sz="3600" b="1" dirty="0">
+            <a:endParaRPr lang="en-US" sz="3600" b="1">
               <a:solidFill>
                 <a:srgbClr val="C00000"/>
               </a:solidFill>
@@ -16181,7 +16329,7 @@
           <a:lstStyle/>
           <a:p>
             <a:r>
-              <a:rPr lang="en-US" dirty="0"/>
+              <a:rPr lang="en-US"/>
               <a:t>Given:</a:t>
             </a:r>
           </a:p>
@@ -16191,7 +16339,7 @@
               <a:buChar char="•"/>
             </a:pPr>
             <a:r>
-              <a:rPr lang="en-US" dirty="0"/>
+              <a:rPr lang="en-US"/>
               <a:t>Zoned, heterogeneous domain</a:t>
             </a:r>
           </a:p>
@@ -16201,7 +16349,7 @@
               <a:buChar char="•"/>
             </a:pPr>
             <a:r>
-              <a:rPr lang="en-US" dirty="0"/>
+              <a:rPr lang="en-US"/>
               <a:t>Left half is 1 m/d</a:t>
             </a:r>
           </a:p>
@@ -16211,7 +16359,7 @@
               <a:buChar char="•"/>
             </a:pPr>
             <a:r>
-              <a:rPr lang="en-US" dirty="0"/>
+              <a:rPr lang="en-US"/>
               <a:t>Right half is 0.5 m/d</a:t>
             </a:r>
           </a:p>
@@ -16348,7 +16496,7 @@
         </p:nvGrpSpPr>
         <p:grpSpPr>
           <a:xfrm>
-            <a:off x="4944794" y="2377440"/>
+            <a:off x="4952411" y="2379894"/>
             <a:ext cx="3045655" cy="1786597"/>
             <a:chOff x="4944794" y="2377440"/>
             <a:chExt cx="3045655" cy="1786597"/>
@@ -16486,7 +16634,7 @@
               <a:lstStyle/>
               <a:p>
                 <a:pPr algn="ctr"/>
-                <a:endParaRPr lang="en-US" dirty="0"/>
+                <a:endParaRPr lang="en-US"/>
               </a:p>
             </p:txBody>
           </p:sp>
@@ -16589,7 +16737,7 @@
               <a:lstStyle/>
               <a:p>
                 <a:pPr algn="ctr"/>
-                <a:endParaRPr lang="en-US" dirty="0"/>
+                <a:endParaRPr lang="en-US"/>
               </a:p>
             </p:txBody>
           </p:sp>
@@ -16624,13 +16772,13 @@
             <a:p>
               <a:pPr algn="ctr"/>
               <a:r>
-                <a:rPr lang="en-US" dirty="0"/>
+                <a:rPr lang="en-US"/>
                 <a:t>Low K</a:t>
               </a:r>
             </a:p>
             <a:p>
               <a:pPr algn="ctr"/>
-              <a:endParaRPr lang="en-US" dirty="0"/>
+              <a:endParaRPr lang="en-US"/>
             </a:p>
           </p:txBody>
         </p:sp>
@@ -16702,7 +16850,7 @@
           <a:lstStyle/>
           <a:p>
             <a:r>
-              <a:rPr lang="en-US" dirty="0">
+              <a:rPr lang="en-US">
                 <a:highlight>
                   <a:srgbClr val="FFFF00"/>
                 </a:highlight>
@@ -16741,15 +16889,15 @@
           <a:lstStyle/>
           <a:p>
             <a:r>
-              <a:rPr lang="en-US" dirty="0"/>
+              <a:rPr lang="en-US"/>
               <a:t>Block Centered Flow Package (.</a:t>
             </a:r>
             <a:r>
-              <a:rPr lang="en-US" dirty="0" err="1"/>
+              <a:rPr lang="en-US" err="1"/>
               <a:t>bcf</a:t>
             </a:r>
             <a:r>
-              <a:rPr lang="en-US" dirty="0"/>
+              <a:rPr lang="en-US"/>
               <a:t>)</a:t>
             </a:r>
           </a:p>
@@ -16759,7 +16907,7 @@
               <a:buChar char="•"/>
             </a:pPr>
             <a:r>
-              <a:rPr lang="en-US" dirty="0"/>
+              <a:rPr lang="en-US"/>
               <a:t>is used to specify properties controlling flow between cells</a:t>
             </a:r>
           </a:p>
@@ -16912,7 +17060,7 @@
             <a:p>
               <a:pPr algn="ctr"/>
               <a:r>
-                <a:rPr lang="en-US" dirty="0"/>
+                <a:rPr lang="en-US"/>
                 <a:t>0.5</a:t>
               </a:r>
             </a:p>
@@ -16964,7 +17112,7 @@
             <a:p>
               <a:pPr algn="ctr"/>
               <a:r>
-                <a:rPr lang="en-US" dirty="0"/>
+                <a:rPr lang="en-US"/>
                 <a:t>1</a:t>
               </a:r>
             </a:p>
@@ -17289,7 +17437,7 @@
           <a:lstStyle/>
           <a:p>
             <a:r>
-              <a:rPr lang="en-US" b="1" dirty="0">
+              <a:rPr lang="en-US" b="1">
                 <a:solidFill>
                   <a:schemeClr val="accent1"/>
                 </a:solidFill>
@@ -17298,7 +17446,7 @@
               <a:t>The Conceptual Model – Model 3</a:t>
             </a:r>
             <a:br>
-              <a:rPr lang="en-US" b="1" dirty="0">
+              <a:rPr lang="en-US" b="1">
                 <a:solidFill>
                   <a:schemeClr val="accent1"/>
                 </a:solidFill>
@@ -17306,7 +17454,7 @@
               </a:rPr>
             </a:br>
             <a:r>
-              <a:rPr lang="en-US" sz="3600" b="1" dirty="0">
+              <a:rPr lang="en-US" sz="3600" b="1">
                 <a:solidFill>
                   <a:srgbClr val="C00000"/>
                 </a:solidFill>
@@ -17314,7 +17462,7 @@
               </a:rPr>
               <a:t>Homogeneous with Inclusion</a:t>
             </a:r>
-            <a:endParaRPr lang="en-US" b="1" dirty="0">
+            <a:endParaRPr lang="en-US" b="1">
               <a:solidFill>
                 <a:schemeClr val="accent1"/>
               </a:solidFill>
@@ -17490,7 +17638,7 @@
                   <a:rPr lang="en-US" dirty="0">
                     <a:cs typeface="Calibri"/>
                   </a:rPr>
-                  <a:t>2500 m</a:t>
+                  <a:t>2400 m</a:t>
                 </a:r>
                 <a:endParaRPr lang="en-US" dirty="0"/>
               </a:p>
@@ -17759,8 +17907,8 @@
           <a:p>
             <a:pPr algn="ctr"/>
             <a:r>
-              <a:rPr lang="en-US" dirty="0"/>
-              <a:t>15m/d</a:t>
+              <a:rPr lang="en-US"/>
+              <a:t>15m</a:t>
             </a:r>
           </a:p>
         </p:txBody>
@@ -17874,7 +18022,7 @@
           <a:lstStyle/>
           <a:p>
             <a:pPr algn="ctr"/>
-            <a:endParaRPr lang="en-US" dirty="0"/>
+            <a:endParaRPr lang="en-US"/>
           </a:p>
         </p:txBody>
       </p:sp>
@@ -17975,8 +18123,8 @@
           <a:p>
             <a:pPr algn="ctr"/>
             <a:r>
-              <a:rPr lang="en-US" dirty="0"/>
-              <a:t>10m/d</a:t>
+              <a:rPr lang="en-US"/>
+              <a:t>10m</a:t>
             </a:r>
           </a:p>
         </p:txBody>
@@ -18124,7 +18272,7 @@
           <a:lstStyle/>
           <a:p>
             <a:r>
-              <a:rPr lang="en-US" dirty="0"/>
+              <a:rPr lang="en-US"/>
               <a:t>Flow in</a:t>
             </a:r>
           </a:p>
@@ -18234,7 +18382,7 @@
           <a:lstStyle/>
           <a:p>
             <a:r>
-              <a:rPr lang="en-US" dirty="0"/>
+              <a:rPr lang="en-US"/>
               <a:t>Flow out</a:t>
             </a:r>
           </a:p>
@@ -18288,7 +18436,7 @@
           <a:p>
             <a:pPr algn="ctr"/>
             <a:r>
-              <a:rPr lang="en-US" dirty="0">
+              <a:rPr lang="en-US">
                 <a:solidFill>
                   <a:schemeClr val="tx1"/>
                 </a:solidFill>
@@ -18298,7 +18446,7 @@
           </a:p>
           <a:p>
             <a:pPr algn="ctr"/>
-            <a:endParaRPr lang="en-US" dirty="0">
+            <a:endParaRPr lang="en-US">
               <a:solidFill>
                 <a:schemeClr val="tx1"/>
               </a:solidFill>
@@ -18335,7 +18483,7 @@
           <a:lstStyle/>
           <a:p>
             <a:r>
-              <a:rPr lang="en-US" dirty="0">
+              <a:rPr lang="en-US">
                 <a:highlight>
                   <a:srgbClr val="FFFF00"/>
                 </a:highlight>
@@ -18379,7 +18527,7 @@
           <a:lstStyle/>
           <a:p>
             <a:r>
-              <a:rPr lang="en-US" dirty="0"/>
+              <a:rPr lang="en-US"/>
               <a:t>Given:</a:t>
             </a:r>
           </a:p>
@@ -18389,7 +18537,7 @@
               <a:buChar char="•"/>
             </a:pPr>
             <a:r>
-              <a:rPr lang="en-US" dirty="0"/>
+              <a:rPr lang="en-US"/>
               <a:t>Homogeneous domain with a low K inclusion in rows 11-15 and columns 11-15</a:t>
             </a:r>
           </a:p>
@@ -18399,7 +18547,7 @@
               <a:buChar char="•"/>
             </a:pPr>
             <a:r>
-              <a:rPr lang="en-US" dirty="0"/>
+              <a:rPr lang="en-US"/>
               <a:t>Background is 1 m/d</a:t>
             </a:r>
           </a:p>
@@ -18409,7 +18557,7 @@
               <a:buChar char="•"/>
             </a:pPr>
             <a:r>
-              <a:rPr lang="en-US" dirty="0"/>
+              <a:rPr lang="en-US"/>
               <a:t>Inclusion is 0.5 m/d</a:t>
             </a:r>
           </a:p>
@@ -18475,7 +18623,7 @@
         </p:blipFill>
         <p:spPr>
           <a:xfrm>
-            <a:off x="1098655" y="1989149"/>
+            <a:off x="1155805" y="1956070"/>
             <a:ext cx="7898914" cy="3219403"/>
           </a:xfrm>
           <a:prstGeom prst="rect">
@@ -18512,15 +18660,15 @@
           <a:lstStyle/>
           <a:p>
             <a:r>
-              <a:rPr lang="en-US" dirty="0"/>
+              <a:rPr lang="en-US"/>
               <a:t>Block Centered Flow Package (.</a:t>
             </a:r>
             <a:r>
-              <a:rPr lang="en-US" dirty="0" err="1"/>
+              <a:rPr lang="en-US" err="1"/>
               <a:t>bcf</a:t>
             </a:r>
             <a:r>
-              <a:rPr lang="en-US" dirty="0"/>
+              <a:rPr lang="en-US"/>
               <a:t>)</a:t>
             </a:r>
           </a:p>
@@ -18530,7 +18678,7 @@
               <a:buChar char="•"/>
             </a:pPr>
             <a:r>
-              <a:rPr lang="en-US" dirty="0"/>
+              <a:rPr lang="en-US"/>
               <a:t>is used to specify properties controlling flow between cells</a:t>
             </a:r>
           </a:p>
@@ -18906,7 +19054,7 @@
           <a:lstStyle/>
           <a:p>
             <a:r>
-              <a:rPr lang="en-US" b="1" dirty="0">
+              <a:rPr lang="en-US" b="1">
                 <a:solidFill>
                   <a:schemeClr val="accent1"/>
                 </a:solidFill>
@@ -18914,7 +19062,7 @@
               </a:rPr>
               <a:t>The Key Figures</a:t>
             </a:r>
-            <a:endParaRPr lang="en-US" b="1" dirty="0">
+            <a:endParaRPr lang="en-US" b="1">
               <a:solidFill>
                 <a:schemeClr val="accent1"/>
               </a:solidFill>
@@ -19326,7 +19474,7 @@
         </p:blipFill>
         <p:spPr>
           <a:xfrm>
-            <a:off x="4768285" y="3034724"/>
+            <a:off x="4875442" y="3124021"/>
             <a:ext cx="2743200" cy="2192867"/>
           </a:xfrm>
           <a:prstGeom prst="rect">
@@ -19356,7 +19504,7 @@
         </p:blipFill>
         <p:spPr>
           <a:xfrm>
-            <a:off x="8825636" y="3034724"/>
+            <a:off x="8920886" y="3124020"/>
             <a:ext cx="2743200" cy="2192867"/>
           </a:xfrm>
           <a:prstGeom prst="rect">
@@ -19629,7 +19777,7 @@
           <a:lstStyle/>
           <a:p>
             <a:pPr algn="ctr"/>
-            <a:endParaRPr lang="en-US" dirty="0"/>
+            <a:endParaRPr lang="en-US"/>
           </a:p>
         </p:txBody>
       </p:sp>
@@ -19750,7 +19898,7 @@
           <a:lstStyle/>
           <a:p>
             <a:pPr algn="ctr"/>
-            <a:endParaRPr lang="en-US" dirty="0"/>
+            <a:endParaRPr lang="en-US"/>
           </a:p>
         </p:txBody>
       </p:sp>
@@ -19811,7 +19959,7 @@
           <a:lstStyle/>
           <a:p>
             <a:r>
-              <a:rPr lang="en-US" b="1" dirty="0">
+              <a:rPr lang="en-US" b="1">
                 <a:solidFill>
                   <a:srgbClr val="0070C0"/>
                 </a:solidFill>
@@ -19819,7 +19967,7 @@
               </a:rPr>
               <a:t>Technical Struggle Share and Care</a:t>
             </a:r>
-            <a:endParaRPr lang="en-US" b="1" dirty="0">
+            <a:endParaRPr lang="en-US" b="1">
               <a:solidFill>
                 <a:srgbClr val="0070C0"/>
               </a:solidFill>
@@ -19856,7 +20004,7 @@
           <a:lstStyle/>
           <a:p>
             <a:r>
-              <a:rPr lang="en-US" dirty="0">
+              <a:rPr lang="en-US">
                 <a:cs typeface="Calibri"/>
               </a:rPr>
               <a:t>This went wrong for us</a:t>
@@ -19865,51 +20013,78 @@
           <a:p>
             <a:pPr lvl="1"/>
             <a:r>
-              <a:rPr lang="en-US" dirty="0"/>
+              <a:rPr lang="en-US"/>
               <a:t>Quinn – </a:t>
             </a:r>
           </a:p>
           <a:p>
             <a:pPr lvl="2"/>
             <a:r>
-              <a:rPr lang="en-US" dirty="0"/>
+              <a:rPr lang="en-US"/>
               <a:t>Mac and MODFLOW interoperability</a:t>
             </a:r>
           </a:p>
           <a:p>
             <a:pPr lvl="2"/>
             <a:r>
-              <a:rPr lang="en-US" dirty="0"/>
+              <a:rPr lang="en-US"/>
               <a:t>Excel Figures</a:t>
             </a:r>
           </a:p>
           <a:p>
             <a:pPr lvl="1"/>
             <a:r>
-              <a:rPr lang="en-US" dirty="0"/>
+              <a:rPr lang="en-US"/>
               <a:t>Jill – </a:t>
             </a:r>
           </a:p>
           <a:p>
             <a:pPr lvl="2"/>
             <a:r>
-              <a:rPr lang="en-US" dirty="0"/>
-              <a:t>Formatting of text file (# spaces, number formatting)</a:t>
+              <a:rPr lang="en-US"/>
+              <a:t>Formatting of text files (# spaces, number formatting)</a:t>
             </a:r>
           </a:p>
           <a:p>
             <a:pPr lvl="2"/>
             <a:r>
-              <a:rPr lang="en-US" dirty="0"/>
+              <a:rPr lang="en-US"/>
               <a:t>Excel Figures </a:t>
             </a:r>
           </a:p>
           <a:p>
             <a:r>
-              <a:rPr lang="en-US" dirty="0">
+              <a:rPr lang="en-US">
                 <a:cs typeface="Calibri"/>
               </a:rPr>
               <a:t>What went wrong for you?</a:t>
+            </a:r>
+          </a:p>
+          <a:p>
+            <a:pPr lvl="1"/>
+            <a:r>
+              <a:rPr lang="en-US">
+                <a:cs typeface="Calibri"/>
+              </a:rPr>
+              <a:t>Having list file update correctly</a:t>
+            </a:r>
+          </a:p>
+          <a:p>
+            <a:pPr lvl="1"/>
+            <a:r>
+              <a:rPr lang="en-US">
+                <a:cs typeface="Calibri"/>
+              </a:rPr>
+              <a:t>Excel Figures</a:t>
+            </a:r>
+          </a:p>
+          <a:p>
+            <a:pPr lvl="1"/>
+            <a:r>
+              <a:rPr lang="en-US">
+                <a:cs typeface="Calibri"/>
+              </a:rPr>
+              <a:t>Confused about Dimensions</a:t>
             </a:r>
           </a:p>
         </p:txBody>
@@ -20076,7 +20251,7 @@
           <a:lstStyle/>
           <a:p>
             <a:r>
-              <a:rPr lang="en-US" b="1" dirty="0">
+              <a:rPr lang="en-US" b="1">
                 <a:solidFill>
                   <a:schemeClr val="accent1"/>
                 </a:solidFill>
@@ -20084,7 +20259,7 @@
               </a:rPr>
               <a:t>Breakout Help Room - Coming Up! (Room 1)</a:t>
             </a:r>
-            <a:endParaRPr lang="en-US" b="1" dirty="0">
+            <a:endParaRPr lang="en-US" b="1">
               <a:solidFill>
                 <a:schemeClr val="accent1"/>
               </a:solidFill>

</xml_diff>